<commit_message>
Add Quizzes to submodule 4, updated slides
</commit_message>
<xml_diff>
--- a/Submodule_4/Lectures/Submodule_4_Lecture_2_Model_Tuning_Interpretation_Deployment.pptx
+++ b/Submodule_4/Lectures/Submodule_4_Lecture_2_Model_Tuning_Interpretation_Deployment.pptx
@@ -6,7 +6,7 @@
     <p:sldMasterId id="2147483682" r:id="rId2"/>
   </p:sldMasterIdLst>
   <p:notesMasterIdLst>
-    <p:notesMasterId r:id="rId24"/>
+    <p:notesMasterId r:id="rId23"/>
   </p:notesMasterIdLst>
   <p:sldIdLst>
     <p:sldId id="257" r:id="rId3"/>
@@ -28,18 +28,17 @@
     <p:sldId id="273" r:id="rId19"/>
     <p:sldId id="274" r:id="rId20"/>
     <p:sldId id="275" r:id="rId21"/>
-    <p:sldId id="276" r:id="rId22"/>
-    <p:sldId id="277" r:id="rId23"/>
+    <p:sldId id="277" r:id="rId22"/>
   </p:sldIdLst>
   <p:sldSz cx="9144000" cy="5143500" type="screen16x9"/>
   <p:notesSz cx="6858000" cy="9144000"/>
   <p:embeddedFontLst>
     <p:embeddedFont>
       <p:font typeface="Roboto" panose="02000000000000000000" pitchFamily="2" charset="0"/>
-      <p:regular r:id="rId25"/>
-      <p:bold r:id="rId26"/>
-      <p:italic r:id="rId27"/>
-      <p:boldItalic r:id="rId28"/>
+      <p:regular r:id="rId24"/>
+      <p:bold r:id="rId25"/>
+      <p:italic r:id="rId26"/>
+      <p:boldItalic r:id="rId27"/>
     </p:embeddedFont>
   </p:embeddedFontLst>
   <p:defaultTextStyle>
@@ -2011,110 +2010,6 @@
 </file>
 
 <file path=ppt/notesSlides/notesSlide20.xml><?xml version="1.0" encoding="utf-8"?>
-<p:notes xmlns:a="http://schemas.openxmlformats.org/drawingml/2006/main" xmlns:r="http://schemas.openxmlformats.org/officeDocument/2006/relationships" xmlns:p="http://schemas.openxmlformats.org/presentationml/2006/main" showMasterSp="0" showMasterPhAnim="0">
-  <p:cSld>
-    <p:spTree>
-      <p:nvGrpSpPr>
-        <p:cNvPr id="1" name="Shape 359"/>
-        <p:cNvGrpSpPr/>
-        <p:nvPr/>
-      </p:nvGrpSpPr>
-      <p:grpSpPr>
-        <a:xfrm>
-          <a:off x="0" y="0"/>
-          <a:ext cx="0" cy="0"/>
-          <a:chOff x="0" y="0"/>
-          <a:chExt cx="0" cy="0"/>
-        </a:xfrm>
-      </p:grpSpPr>
-      <p:sp>
-        <p:nvSpPr>
-          <p:cNvPr id="360" name="Google Shape;360;g11b9f8cd8a3_0_64:notes"/>
-          <p:cNvSpPr>
-            <a:spLocks noGrp="1" noRot="1" noChangeAspect="1"/>
-          </p:cNvSpPr>
-          <p:nvPr>
-            <p:ph type="sldImg" idx="2"/>
-          </p:nvPr>
-        </p:nvSpPr>
-        <p:spPr>
-          <a:xfrm>
-            <a:off x="381000" y="685800"/>
-            <a:ext cx="6096000" cy="3429000"/>
-          </a:xfrm>
-          <a:custGeom>
-            <a:avLst/>
-            <a:gdLst/>
-            <a:ahLst/>
-            <a:cxnLst/>
-            <a:rect l="l" t="t" r="r" b="b"/>
-            <a:pathLst>
-              <a:path w="120000" h="120000" extrusionOk="0">
-                <a:moveTo>
-                  <a:pt x="0" y="0"/>
-                </a:moveTo>
-                <a:lnTo>
-                  <a:pt x="120000" y="0"/>
-                </a:lnTo>
-                <a:lnTo>
-                  <a:pt x="120000" y="120000"/>
-                </a:lnTo>
-                <a:lnTo>
-                  <a:pt x="0" y="120000"/>
-                </a:lnTo>
-                <a:close/>
-              </a:path>
-            </a:pathLst>
-          </a:custGeom>
-        </p:spPr>
-      </p:sp>
-      <p:sp>
-        <p:nvSpPr>
-          <p:cNvPr id="361" name="Google Shape;361;g11b9f8cd8a3_0_64:notes"/>
-          <p:cNvSpPr txBox="1">
-            <a:spLocks noGrp="1"/>
-          </p:cNvSpPr>
-          <p:nvPr>
-            <p:ph type="body" idx="1"/>
-          </p:nvPr>
-        </p:nvSpPr>
-        <p:spPr>
-          <a:xfrm>
-            <a:off x="685800" y="4343400"/>
-            <a:ext cx="5486400" cy="4114800"/>
-          </a:xfrm>
-          <a:prstGeom prst="rect">
-            <a:avLst/>
-          </a:prstGeom>
-        </p:spPr>
-        <p:txBody>
-          <a:bodyPr spcFirstLastPara="1" wrap="square" lIns="91425" tIns="91425" rIns="91425" bIns="91425" anchor="t" anchorCtr="0">
-            <a:noAutofit/>
-          </a:bodyPr>
-          <a:lstStyle/>
-          <a:p>
-            <a:pPr marL="0" lvl="0" indent="0" algn="l" rtl="0">
-              <a:spcBef>
-                <a:spcPts val="0"/>
-              </a:spcBef>
-              <a:spcAft>
-                <a:spcPts val="0"/>
-              </a:spcAft>
-              <a:buNone/>
-            </a:pPr>
-            <a:endParaRPr/>
-          </a:p>
-        </p:txBody>
-      </p:sp>
-    </p:spTree>
-  </p:cSld>
-  <p:clrMapOvr>
-    <a:masterClrMapping/>
-  </p:clrMapOvr>
-</p:notes>
-</file>
-
-<file path=ppt/notesSlides/notesSlide21.xml><?xml version="1.0" encoding="utf-8"?>
 <p:notes xmlns:a="http://schemas.openxmlformats.org/drawingml/2006/main" xmlns:r="http://schemas.openxmlformats.org/officeDocument/2006/relationships" xmlns:p="http://schemas.openxmlformats.org/presentationml/2006/main" showMasterSp="0" showMasterPhAnim="0">
   <p:cSld>
     <p:spTree>
@@ -18118,1027 +18013,6 @@
   <p:cSld>
     <p:spTree>
       <p:nvGrpSpPr>
-        <p:cNvPr id="1" name="Shape 362"/>
-        <p:cNvGrpSpPr/>
-        <p:nvPr/>
-      </p:nvGrpSpPr>
-      <p:grpSpPr>
-        <a:xfrm>
-          <a:off x="0" y="0"/>
-          <a:ext cx="0" cy="0"/>
-          <a:chOff x="0" y="0"/>
-          <a:chExt cx="0" cy="0"/>
-        </a:xfrm>
-      </p:grpSpPr>
-      <p:pic>
-        <p:nvPicPr>
-          <p:cNvPr id="363" name="Google Shape;363;p57"/>
-          <p:cNvPicPr preferRelativeResize="0"/>
-          <p:nvPr/>
-        </p:nvPicPr>
-        <p:blipFill>
-          <a:blip r:embed="rId3">
-            <a:alphaModFix/>
-          </a:blip>
-          <a:stretch>
-            <a:fillRect/>
-          </a:stretch>
-        </p:blipFill>
-        <p:spPr>
-          <a:xfrm>
-            <a:off x="0" y="4572400"/>
-            <a:ext cx="9144000" cy="433200"/>
-          </a:xfrm>
-          <a:prstGeom prst="rect">
-            <a:avLst/>
-          </a:prstGeom>
-          <a:noFill/>
-          <a:ln>
-            <a:noFill/>
-          </a:ln>
-        </p:spPr>
-      </p:pic>
-      <p:sp>
-        <p:nvSpPr>
-          <p:cNvPr id="364" name="Google Shape;364;p57"/>
-          <p:cNvSpPr txBox="1">
-            <a:spLocks noGrp="1"/>
-          </p:cNvSpPr>
-          <p:nvPr>
-            <p:ph type="title"/>
-          </p:nvPr>
-        </p:nvSpPr>
-        <p:spPr>
-          <a:xfrm>
-            <a:off x="311700" y="129575"/>
-            <a:ext cx="8520600" cy="572700"/>
-          </a:xfrm>
-          <a:prstGeom prst="rect">
-            <a:avLst/>
-          </a:prstGeom>
-        </p:spPr>
-        <p:txBody>
-          <a:bodyPr spcFirstLastPara="1" wrap="square" lIns="91425" tIns="91425" rIns="91425" bIns="91425" anchor="t" anchorCtr="0">
-            <a:normAutofit fontScale="90000"/>
-          </a:bodyPr>
-          <a:lstStyle/>
-          <a:p>
-            <a:pPr marL="0" lvl="0" indent="0" algn="l" rtl="0">
-              <a:spcBef>
-                <a:spcPts val="0"/>
-              </a:spcBef>
-              <a:spcAft>
-                <a:spcPts val="0"/>
-              </a:spcAft>
-              <a:buNone/>
-            </a:pPr>
-            <a:r>
-              <a:rPr lang="en">
-                <a:solidFill>
-                  <a:schemeClr val="accent1"/>
-                </a:solidFill>
-              </a:rPr>
-              <a:t>Quiz</a:t>
-            </a:r>
-            <a:endParaRPr>
-              <a:solidFill>
-                <a:schemeClr val="accent1"/>
-              </a:solidFill>
-            </a:endParaRPr>
-          </a:p>
-        </p:txBody>
-      </p:sp>
-      <p:sp>
-        <p:nvSpPr>
-          <p:cNvPr id="365" name="Google Shape;365;p57"/>
-          <p:cNvSpPr txBox="1">
-            <a:spLocks noGrp="1"/>
-          </p:cNvSpPr>
-          <p:nvPr>
-            <p:ph type="sldNum" idx="12"/>
-          </p:nvPr>
-        </p:nvSpPr>
-        <p:spPr>
-          <a:xfrm>
-            <a:off x="8" y="4592192"/>
-            <a:ext cx="548700" cy="393600"/>
-          </a:xfrm>
-          <a:prstGeom prst="rect">
-            <a:avLst/>
-          </a:prstGeom>
-        </p:spPr>
-        <p:txBody>
-          <a:bodyPr spcFirstLastPara="1" wrap="square" lIns="91425" tIns="91425" rIns="91425" bIns="91425" anchor="ctr" anchorCtr="0">
-            <a:normAutofit/>
-          </a:bodyPr>
-          <a:lstStyle/>
-          <a:p>
-            <a:pPr marL="0" lvl="0" indent="0" algn="r" rtl="0">
-              <a:spcBef>
-                <a:spcPts val="0"/>
-              </a:spcBef>
-              <a:spcAft>
-                <a:spcPts val="0"/>
-              </a:spcAft>
-              <a:buNone/>
-            </a:pPr>
-            <a:fld id="{00000000-1234-1234-1234-123412341234}" type="slidenum">
-              <a:rPr lang="en"/>
-              <a:t>20</a:t>
-            </a:fld>
-            <a:endParaRPr/>
-          </a:p>
-        </p:txBody>
-      </p:sp>
-      <p:sp>
-        <p:nvSpPr>
-          <p:cNvPr id="366" name="Google Shape;366;p57"/>
-          <p:cNvSpPr txBox="1"/>
-          <p:nvPr/>
-        </p:nvSpPr>
-        <p:spPr>
-          <a:xfrm>
-            <a:off x="405900" y="579225"/>
-            <a:ext cx="8520600" cy="461700"/>
-          </a:xfrm>
-          <a:prstGeom prst="rect">
-            <a:avLst/>
-          </a:prstGeom>
-          <a:noFill/>
-          <a:ln>
-            <a:noFill/>
-          </a:ln>
-        </p:spPr>
-        <p:txBody>
-          <a:bodyPr spcFirstLastPara="1" wrap="square" lIns="91425" tIns="91425" rIns="91425" bIns="91425" anchor="t" anchorCtr="0">
-            <a:spAutoFit/>
-          </a:bodyPr>
-          <a:lstStyle/>
-          <a:p>
-            <a:pPr marL="457200" lvl="0" indent="-342900" algn="l" rtl="0">
-              <a:spcBef>
-                <a:spcPts val="0"/>
-              </a:spcBef>
-              <a:spcAft>
-                <a:spcPts val="0"/>
-              </a:spcAft>
-              <a:buSzPts val="1800"/>
-              <a:buFont typeface="Roboto"/>
-              <a:buChar char="●"/>
-            </a:pPr>
-            <a:r>
-              <a:rPr lang="en" sz="1800">
-                <a:latin typeface="Roboto"/>
-                <a:ea typeface="Roboto"/>
-                <a:cs typeface="Roboto"/>
-                <a:sym typeface="Roboto"/>
-              </a:rPr>
-              <a:t>What data is used to optimize the parameter settings of a learning algorithm?</a:t>
-            </a:r>
-            <a:endParaRPr sz="1800">
-              <a:latin typeface="Roboto"/>
-              <a:ea typeface="Roboto"/>
-              <a:cs typeface="Roboto"/>
-              <a:sym typeface="Roboto"/>
-            </a:endParaRPr>
-          </a:p>
-        </p:txBody>
-      </p:sp>
-      <p:sp>
-        <p:nvSpPr>
-          <p:cNvPr id="367" name="Google Shape;367;p57"/>
-          <p:cNvSpPr txBox="1"/>
-          <p:nvPr/>
-        </p:nvSpPr>
-        <p:spPr>
-          <a:xfrm>
-            <a:off x="661900" y="1378950"/>
-            <a:ext cx="7143000" cy="400200"/>
-          </a:xfrm>
-          <a:prstGeom prst="rect">
-            <a:avLst/>
-          </a:prstGeom>
-          <a:noFill/>
-          <a:ln>
-            <a:noFill/>
-          </a:ln>
-        </p:spPr>
-        <p:txBody>
-          <a:bodyPr spcFirstLastPara="1" wrap="square" lIns="91425" tIns="91425" rIns="91425" bIns="91425" anchor="t" anchorCtr="0">
-            <a:spAutoFit/>
-          </a:bodyPr>
-          <a:lstStyle/>
-          <a:p>
-            <a:pPr marL="0" lvl="0" indent="0" algn="l" rtl="0">
-              <a:spcBef>
-                <a:spcPts val="0"/>
-              </a:spcBef>
-              <a:spcAft>
-                <a:spcPts val="0"/>
-              </a:spcAft>
-              <a:buNone/>
-            </a:pPr>
-            <a:endParaRPr/>
-          </a:p>
-        </p:txBody>
-      </p:sp>
-      <p:sp>
-        <p:nvSpPr>
-          <p:cNvPr id="368" name="Google Shape;368;p57"/>
-          <p:cNvSpPr txBox="1"/>
-          <p:nvPr/>
-        </p:nvSpPr>
-        <p:spPr>
-          <a:xfrm>
-            <a:off x="548700" y="900500"/>
-            <a:ext cx="7694700" cy="1046700"/>
-          </a:xfrm>
-          <a:prstGeom prst="rect">
-            <a:avLst/>
-          </a:prstGeom>
-          <a:noFill/>
-          <a:ln>
-            <a:noFill/>
-          </a:ln>
-        </p:spPr>
-        <p:txBody>
-          <a:bodyPr spcFirstLastPara="1" wrap="square" lIns="91425" tIns="91425" rIns="91425" bIns="91425" anchor="t" anchorCtr="0">
-            <a:spAutoFit/>
-          </a:bodyPr>
-          <a:lstStyle/>
-          <a:p>
-            <a:pPr marL="457200" lvl="0" indent="-317500" algn="l" rtl="0">
-              <a:spcBef>
-                <a:spcPts val="0"/>
-              </a:spcBef>
-              <a:spcAft>
-                <a:spcPts val="0"/>
-              </a:spcAft>
-              <a:buSzPts val="1400"/>
-              <a:buChar char="❏"/>
-            </a:pPr>
-            <a:r>
-              <a:rPr lang="en"/>
-              <a:t>Testing data</a:t>
-            </a:r>
-            <a:endParaRPr/>
-          </a:p>
-          <a:p>
-            <a:pPr marL="457200" lvl="0" indent="-317500" algn="l" rtl="0">
-              <a:spcBef>
-                <a:spcPts val="0"/>
-              </a:spcBef>
-              <a:spcAft>
-                <a:spcPts val="0"/>
-              </a:spcAft>
-              <a:buSzPts val="1400"/>
-              <a:buChar char="❏"/>
-            </a:pPr>
-            <a:r>
-              <a:rPr lang="en"/>
-              <a:t>Training data</a:t>
-            </a:r>
-            <a:endParaRPr/>
-          </a:p>
-          <a:p>
-            <a:pPr marL="457200" lvl="0" indent="-317500" algn="l" rtl="0">
-              <a:spcBef>
-                <a:spcPts val="0"/>
-              </a:spcBef>
-              <a:spcAft>
-                <a:spcPts val="0"/>
-              </a:spcAft>
-              <a:buSzPts val="1400"/>
-              <a:buChar char="❏"/>
-            </a:pPr>
-            <a:r>
-              <a:rPr lang="en"/>
-              <a:t>Validation data</a:t>
-            </a:r>
-            <a:endParaRPr/>
-          </a:p>
-          <a:p>
-            <a:pPr marL="457200" lvl="0" indent="-317500" algn="l" rtl="0">
-              <a:spcBef>
-                <a:spcPts val="0"/>
-              </a:spcBef>
-              <a:spcAft>
-                <a:spcPts val="0"/>
-              </a:spcAft>
-              <a:buSzPts val="1400"/>
-              <a:buChar char="❏"/>
-            </a:pPr>
-            <a:r>
-              <a:rPr lang="en"/>
-              <a:t>None of the above</a:t>
-            </a:r>
-            <a:endParaRPr/>
-          </a:p>
-        </p:txBody>
-      </p:sp>
-      <p:sp>
-        <p:nvSpPr>
-          <p:cNvPr id="369" name="Google Shape;369;p57"/>
-          <p:cNvSpPr txBox="1"/>
-          <p:nvPr/>
-        </p:nvSpPr>
-        <p:spPr>
-          <a:xfrm>
-            <a:off x="405900" y="1821625"/>
-            <a:ext cx="8584800" cy="431100"/>
-          </a:xfrm>
-          <a:prstGeom prst="rect">
-            <a:avLst/>
-          </a:prstGeom>
-          <a:noFill/>
-          <a:ln>
-            <a:noFill/>
-          </a:ln>
-        </p:spPr>
-        <p:txBody>
-          <a:bodyPr spcFirstLastPara="1" wrap="square" lIns="91425" tIns="91425" rIns="91425" bIns="91425" anchor="t" anchorCtr="0">
-            <a:spAutoFit/>
-          </a:bodyPr>
-          <a:lstStyle/>
-          <a:p>
-            <a:pPr marL="457200" lvl="0" indent="-330200" algn="l" rtl="0">
-              <a:spcBef>
-                <a:spcPts val="0"/>
-              </a:spcBef>
-              <a:spcAft>
-                <a:spcPts val="0"/>
-              </a:spcAft>
-              <a:buSzPts val="1600"/>
-              <a:buFont typeface="Roboto"/>
-              <a:buChar char="●"/>
-            </a:pPr>
-            <a:r>
-              <a:rPr lang="en" sz="1600">
-                <a:latin typeface="Roboto"/>
-                <a:ea typeface="Roboto"/>
-                <a:cs typeface="Roboto"/>
-                <a:sym typeface="Roboto"/>
-              </a:rPr>
-              <a:t>Which of the followings are hyperparameters?</a:t>
-            </a:r>
-            <a:endParaRPr sz="1600">
-              <a:latin typeface="Roboto"/>
-              <a:ea typeface="Roboto"/>
-              <a:cs typeface="Roboto"/>
-              <a:sym typeface="Roboto"/>
-            </a:endParaRPr>
-          </a:p>
-        </p:txBody>
-      </p:sp>
-      <p:sp>
-        <p:nvSpPr>
-          <p:cNvPr id="370" name="Google Shape;370;p57"/>
-          <p:cNvSpPr txBox="1"/>
-          <p:nvPr/>
-        </p:nvSpPr>
-        <p:spPr>
-          <a:xfrm>
-            <a:off x="548700" y="2199288"/>
-            <a:ext cx="7694700" cy="1046700"/>
-          </a:xfrm>
-          <a:prstGeom prst="rect">
-            <a:avLst/>
-          </a:prstGeom>
-          <a:noFill/>
-          <a:ln>
-            <a:noFill/>
-          </a:ln>
-        </p:spPr>
-        <p:txBody>
-          <a:bodyPr spcFirstLastPara="1" wrap="square" lIns="91425" tIns="91425" rIns="91425" bIns="91425" anchor="t" anchorCtr="0">
-            <a:spAutoFit/>
-          </a:bodyPr>
-          <a:lstStyle/>
-          <a:p>
-            <a:pPr marL="457200" lvl="0" indent="-317500" algn="l" rtl="0">
-              <a:spcBef>
-                <a:spcPts val="0"/>
-              </a:spcBef>
-              <a:spcAft>
-                <a:spcPts val="0"/>
-              </a:spcAft>
-              <a:buSzPts val="1400"/>
-              <a:buChar char="❏"/>
-            </a:pPr>
-            <a:r>
-              <a:rPr lang="en"/>
-              <a:t>Regularization penalty</a:t>
-            </a:r>
-            <a:endParaRPr/>
-          </a:p>
-          <a:p>
-            <a:pPr marL="457200" lvl="0" indent="-317500" algn="l" rtl="0">
-              <a:spcBef>
-                <a:spcPts val="0"/>
-              </a:spcBef>
-              <a:spcAft>
-                <a:spcPts val="0"/>
-              </a:spcAft>
-              <a:buSzPts val="1400"/>
-              <a:buChar char="❏"/>
-            </a:pPr>
-            <a:r>
-              <a:rPr lang="en"/>
-              <a:t>Learning rate</a:t>
-            </a:r>
-            <a:endParaRPr/>
-          </a:p>
-          <a:p>
-            <a:pPr marL="457200" lvl="0" indent="-317500" algn="l" rtl="0">
-              <a:spcBef>
-                <a:spcPts val="0"/>
-              </a:spcBef>
-              <a:spcAft>
-                <a:spcPts val="0"/>
-              </a:spcAft>
-              <a:buSzPts val="1400"/>
-              <a:buChar char="❏"/>
-            </a:pPr>
-            <a:r>
-              <a:rPr lang="en"/>
-              <a:t>Different kernels</a:t>
-            </a:r>
-            <a:endParaRPr/>
-          </a:p>
-          <a:p>
-            <a:pPr marL="457200" lvl="0" indent="-317500" algn="l" rtl="0">
-              <a:spcBef>
-                <a:spcPts val="0"/>
-              </a:spcBef>
-              <a:spcAft>
-                <a:spcPts val="0"/>
-              </a:spcAft>
-              <a:buSzPts val="1400"/>
-              <a:buChar char="❏"/>
-            </a:pPr>
-            <a:r>
-              <a:rPr lang="en"/>
-              <a:t>All of the above</a:t>
-            </a:r>
-            <a:endParaRPr/>
-          </a:p>
-        </p:txBody>
-      </p:sp>
-      <p:sp>
-        <p:nvSpPr>
-          <p:cNvPr id="371" name="Google Shape;371;p57"/>
-          <p:cNvSpPr txBox="1"/>
-          <p:nvPr/>
-        </p:nvSpPr>
-        <p:spPr>
-          <a:xfrm>
-            <a:off x="405900" y="3197025"/>
-            <a:ext cx="8584800" cy="461700"/>
-          </a:xfrm>
-          <a:prstGeom prst="rect">
-            <a:avLst/>
-          </a:prstGeom>
-          <a:noFill/>
-          <a:ln>
-            <a:noFill/>
-          </a:ln>
-        </p:spPr>
-        <p:txBody>
-          <a:bodyPr spcFirstLastPara="1" wrap="square" lIns="91425" tIns="91425" rIns="91425" bIns="91425" anchor="t" anchorCtr="0">
-            <a:spAutoFit/>
-          </a:bodyPr>
-          <a:lstStyle/>
-          <a:p>
-            <a:pPr marL="457200" lvl="0" indent="-342900" algn="l" rtl="0">
-              <a:spcBef>
-                <a:spcPts val="0"/>
-              </a:spcBef>
-              <a:spcAft>
-                <a:spcPts val="0"/>
-              </a:spcAft>
-              <a:buSzPts val="1800"/>
-              <a:buFont typeface="Roboto"/>
-              <a:buChar char="●"/>
-            </a:pPr>
-            <a:r>
-              <a:rPr lang="en" sz="1800">
-                <a:latin typeface="Roboto"/>
-                <a:ea typeface="Roboto"/>
-                <a:cs typeface="Roboto"/>
-                <a:sym typeface="Roboto"/>
-              </a:rPr>
-              <a:t>Which of the following model is the best model we are looking for?</a:t>
-            </a:r>
-            <a:endParaRPr sz="1800">
-              <a:latin typeface="Roboto"/>
-              <a:ea typeface="Roboto"/>
-              <a:cs typeface="Roboto"/>
-              <a:sym typeface="Roboto"/>
-            </a:endParaRPr>
-          </a:p>
-        </p:txBody>
-      </p:sp>
-      <p:sp>
-        <p:nvSpPr>
-          <p:cNvPr id="372" name="Google Shape;372;p57"/>
-          <p:cNvSpPr txBox="1"/>
-          <p:nvPr/>
-        </p:nvSpPr>
-        <p:spPr>
-          <a:xfrm>
-            <a:off x="548700" y="3545488"/>
-            <a:ext cx="7694700" cy="1046700"/>
-          </a:xfrm>
-          <a:prstGeom prst="rect">
-            <a:avLst/>
-          </a:prstGeom>
-          <a:noFill/>
-          <a:ln>
-            <a:noFill/>
-          </a:ln>
-        </p:spPr>
-        <p:txBody>
-          <a:bodyPr spcFirstLastPara="1" wrap="square" lIns="91425" tIns="91425" rIns="91425" bIns="91425" anchor="t" anchorCtr="0">
-            <a:spAutoFit/>
-          </a:bodyPr>
-          <a:lstStyle/>
-          <a:p>
-            <a:pPr marL="457200" lvl="0" indent="-317500" algn="l" rtl="0">
-              <a:spcBef>
-                <a:spcPts val="0"/>
-              </a:spcBef>
-              <a:spcAft>
-                <a:spcPts val="0"/>
-              </a:spcAft>
-              <a:buSzPts val="1400"/>
-              <a:buChar char="❏"/>
-            </a:pPr>
-            <a:r>
-              <a:rPr lang="en"/>
-              <a:t>High bias, high variance</a:t>
-            </a:r>
-            <a:endParaRPr/>
-          </a:p>
-          <a:p>
-            <a:pPr marL="457200" lvl="0" indent="-317500" algn="l" rtl="0">
-              <a:spcBef>
-                <a:spcPts val="0"/>
-              </a:spcBef>
-              <a:spcAft>
-                <a:spcPts val="0"/>
-              </a:spcAft>
-              <a:buSzPts val="1400"/>
-              <a:buChar char="❏"/>
-            </a:pPr>
-            <a:r>
-              <a:rPr lang="en"/>
-              <a:t>High bias, low variance</a:t>
-            </a:r>
-            <a:endParaRPr/>
-          </a:p>
-          <a:p>
-            <a:pPr marL="457200" lvl="0" indent="-317500" algn="l" rtl="0">
-              <a:spcBef>
-                <a:spcPts val="0"/>
-              </a:spcBef>
-              <a:spcAft>
-                <a:spcPts val="0"/>
-              </a:spcAft>
-              <a:buSzPts val="1400"/>
-              <a:buChar char="❏"/>
-            </a:pPr>
-            <a:r>
-              <a:rPr lang="en"/>
-              <a:t>Low bias. high variance</a:t>
-            </a:r>
-            <a:endParaRPr/>
-          </a:p>
-          <a:p>
-            <a:pPr marL="457200" lvl="0" indent="-317500" algn="l" rtl="0">
-              <a:spcBef>
-                <a:spcPts val="0"/>
-              </a:spcBef>
-              <a:spcAft>
-                <a:spcPts val="0"/>
-              </a:spcAft>
-              <a:buSzPts val="1400"/>
-              <a:buChar char="❏"/>
-            </a:pPr>
-            <a:r>
-              <a:rPr lang="en"/>
-              <a:t>Low bias, low variance</a:t>
-            </a:r>
-            <a:endParaRPr/>
-          </a:p>
-        </p:txBody>
-      </p:sp>
-      <p:sp>
-        <p:nvSpPr>
-          <p:cNvPr id="373" name="Google Shape;373;p57"/>
-          <p:cNvSpPr txBox="1"/>
-          <p:nvPr/>
-        </p:nvSpPr>
-        <p:spPr>
-          <a:xfrm>
-            <a:off x="661900" y="1250688"/>
-            <a:ext cx="427500" cy="400200"/>
-          </a:xfrm>
-          <a:prstGeom prst="rect">
-            <a:avLst/>
-          </a:prstGeom>
-          <a:noFill/>
-          <a:ln>
-            <a:noFill/>
-          </a:ln>
-        </p:spPr>
-        <p:txBody>
-          <a:bodyPr spcFirstLastPara="1" wrap="square" lIns="91425" tIns="91425" rIns="91425" bIns="91425" anchor="t" anchorCtr="0">
-            <a:spAutoFit/>
-          </a:bodyPr>
-          <a:lstStyle/>
-          <a:p>
-            <a:pPr marL="0" lvl="0" indent="0" algn="l" rtl="0">
-              <a:spcBef>
-                <a:spcPts val="0"/>
-              </a:spcBef>
-              <a:spcAft>
-                <a:spcPts val="0"/>
-              </a:spcAft>
-              <a:buNone/>
-            </a:pPr>
-            <a:r>
-              <a:rPr lang="en"/>
-              <a:t>✔</a:t>
-            </a:r>
-            <a:endParaRPr/>
-          </a:p>
-        </p:txBody>
-      </p:sp>
-      <p:sp>
-        <p:nvSpPr>
-          <p:cNvPr id="374" name="Google Shape;374;p57"/>
-          <p:cNvSpPr txBox="1"/>
-          <p:nvPr/>
-        </p:nvSpPr>
-        <p:spPr>
-          <a:xfrm>
-            <a:off x="661900" y="2835900"/>
-            <a:ext cx="427500" cy="400200"/>
-          </a:xfrm>
-          <a:prstGeom prst="rect">
-            <a:avLst/>
-          </a:prstGeom>
-          <a:noFill/>
-          <a:ln>
-            <a:noFill/>
-          </a:ln>
-        </p:spPr>
-        <p:txBody>
-          <a:bodyPr spcFirstLastPara="1" wrap="square" lIns="91425" tIns="91425" rIns="91425" bIns="91425" anchor="t" anchorCtr="0">
-            <a:spAutoFit/>
-          </a:bodyPr>
-          <a:lstStyle/>
-          <a:p>
-            <a:pPr marL="0" lvl="0" indent="0" algn="l" rtl="0">
-              <a:spcBef>
-                <a:spcPts val="0"/>
-              </a:spcBef>
-              <a:spcAft>
-                <a:spcPts val="0"/>
-              </a:spcAft>
-              <a:buNone/>
-            </a:pPr>
-            <a:r>
-              <a:rPr lang="en"/>
-              <a:t>✔</a:t>
-            </a:r>
-            <a:endParaRPr/>
-          </a:p>
-        </p:txBody>
-      </p:sp>
-      <p:sp>
-        <p:nvSpPr>
-          <p:cNvPr id="375" name="Google Shape;375;p57"/>
-          <p:cNvSpPr txBox="1"/>
-          <p:nvPr/>
-        </p:nvSpPr>
-        <p:spPr>
-          <a:xfrm>
-            <a:off x="661900" y="4124800"/>
-            <a:ext cx="427500" cy="400200"/>
-          </a:xfrm>
-          <a:prstGeom prst="rect">
-            <a:avLst/>
-          </a:prstGeom>
-          <a:noFill/>
-          <a:ln>
-            <a:noFill/>
-          </a:ln>
-        </p:spPr>
-        <p:txBody>
-          <a:bodyPr spcFirstLastPara="1" wrap="square" lIns="91425" tIns="91425" rIns="91425" bIns="91425" anchor="t" anchorCtr="0">
-            <a:spAutoFit/>
-          </a:bodyPr>
-          <a:lstStyle/>
-          <a:p>
-            <a:pPr marL="0" lvl="0" indent="0" algn="l" rtl="0">
-              <a:spcBef>
-                <a:spcPts val="0"/>
-              </a:spcBef>
-              <a:spcAft>
-                <a:spcPts val="0"/>
-              </a:spcAft>
-              <a:buNone/>
-            </a:pPr>
-            <a:r>
-              <a:rPr lang="en"/>
-              <a:t>✔</a:t>
-            </a:r>
-            <a:endParaRPr/>
-          </a:p>
-        </p:txBody>
-      </p:sp>
-      <p:sp>
-        <p:nvSpPr>
-          <p:cNvPr id="376" name="Google Shape;376;p57"/>
-          <p:cNvSpPr txBox="1"/>
-          <p:nvPr/>
-        </p:nvSpPr>
-        <p:spPr>
-          <a:xfrm>
-            <a:off x="4243675" y="4099250"/>
-            <a:ext cx="4154700" cy="400200"/>
-          </a:xfrm>
-          <a:prstGeom prst="rect">
-            <a:avLst/>
-          </a:prstGeom>
-          <a:noFill/>
-          <a:ln>
-            <a:noFill/>
-          </a:ln>
-        </p:spPr>
-        <p:txBody>
-          <a:bodyPr spcFirstLastPara="1" wrap="square" lIns="91425" tIns="91425" rIns="91425" bIns="91425" anchor="t" anchorCtr="0">
-            <a:spAutoFit/>
-          </a:bodyPr>
-          <a:lstStyle/>
-          <a:p>
-            <a:pPr marL="0" lvl="0" indent="0" algn="l" rtl="0">
-              <a:spcBef>
-                <a:spcPts val="0"/>
-              </a:spcBef>
-              <a:spcAft>
-                <a:spcPts val="0"/>
-              </a:spcAft>
-              <a:buNone/>
-            </a:pPr>
-            <a:r>
-              <a:rPr lang="en" u="sng">
-                <a:solidFill>
-                  <a:schemeClr val="hlink"/>
-                </a:solidFill>
-                <a:hlinkClick r:id="rId4"/>
-              </a:rPr>
-              <a:t>https://forms.gle/4pYqDEqpw4orJ4Vz6</a:t>
-            </a:r>
-            <a:r>
-              <a:rPr lang="en"/>
-              <a:t> </a:t>
-            </a:r>
-            <a:endParaRPr/>
-          </a:p>
-        </p:txBody>
-      </p:sp>
-      <p:pic>
-        <p:nvPicPr>
-          <p:cNvPr id="377" name="Google Shape;377;p57"/>
-          <p:cNvPicPr preferRelativeResize="0"/>
-          <p:nvPr/>
-        </p:nvPicPr>
-        <p:blipFill>
-          <a:blip r:embed="rId5">
-            <a:alphaModFix/>
-          </a:blip>
-          <a:stretch>
-            <a:fillRect/>
-          </a:stretch>
-        </p:blipFill>
-        <p:spPr>
-          <a:xfrm>
-            <a:off x="7974500" y="3695821"/>
-            <a:ext cx="746051" cy="746051"/>
-          </a:xfrm>
-          <a:prstGeom prst="rect">
-            <a:avLst/>
-          </a:prstGeom>
-          <a:noFill/>
-          <a:ln>
-            <a:noFill/>
-          </a:ln>
-        </p:spPr>
-      </p:pic>
-    </p:spTree>
-  </p:cSld>
-  <p:clrMapOvr>
-    <a:masterClrMapping/>
-  </p:clrMapOvr>
-  <p:timing>
-    <p:tnLst>
-      <p:par>
-        <p:cTn id="1" dur="indefinite" restart="never" nodeType="tmRoot">
-          <p:childTnLst>
-            <p:seq concurrent="1" nextAc="seek">
-              <p:cTn id="2" dur="indefinite" nodeType="mainSeq">
-                <p:childTnLst>
-                  <p:par>
-                    <p:cTn id="3" fill="hold">
-                      <p:stCondLst>
-                        <p:cond delay="indefinite"/>
-                      </p:stCondLst>
-                      <p:childTnLst>
-                        <p:par>
-                          <p:cTn id="4" fill="hold">
-                            <p:stCondLst>
-                              <p:cond delay="0"/>
-                            </p:stCondLst>
-                            <p:childTnLst>
-                              <p:par>
-                                <p:cTn id="5" presetID="10" presetClass="entr" presetSubtype="0" fill="hold" nodeType="clickEffect">
-                                  <p:stCondLst>
-                                    <p:cond delay="0"/>
-                                  </p:stCondLst>
-                                  <p:childTnLst>
-                                    <p:set>
-                                      <p:cBhvr>
-                                        <p:cTn id="6" dur="1" fill="hold">
-                                          <p:stCondLst>
-                                            <p:cond delay="0"/>
-                                          </p:stCondLst>
-                                        </p:cTn>
-                                        <p:tgtEl>
-                                          <p:spTgt spid="373"/>
-                                        </p:tgtEl>
-                                        <p:attrNameLst>
-                                          <p:attrName>style.visibility</p:attrName>
-                                        </p:attrNameLst>
-                                      </p:cBhvr>
-                                      <p:to>
-                                        <p:strVal val="visible"/>
-                                      </p:to>
-                                    </p:set>
-                                    <p:animEffect transition="in" filter="fade">
-                                      <p:cBhvr>
-                                        <p:cTn id="7" dur="1000"/>
-                                        <p:tgtEl>
-                                          <p:spTgt spid="373"/>
-                                        </p:tgtEl>
-                                      </p:cBhvr>
-                                    </p:animEffect>
-                                  </p:childTnLst>
-                                </p:cTn>
-                              </p:par>
-                            </p:childTnLst>
-                          </p:cTn>
-                        </p:par>
-                      </p:childTnLst>
-                    </p:cTn>
-                  </p:par>
-                  <p:par>
-                    <p:cTn id="8" fill="hold">
-                      <p:stCondLst>
-                        <p:cond delay="indefinite"/>
-                      </p:stCondLst>
-                      <p:childTnLst>
-                        <p:par>
-                          <p:cTn id="9" fill="hold">
-                            <p:stCondLst>
-                              <p:cond delay="0"/>
-                            </p:stCondLst>
-                            <p:childTnLst>
-                              <p:par>
-                                <p:cTn id="10" presetID="10" presetClass="entr" presetSubtype="0" fill="hold" nodeType="clickEffect">
-                                  <p:stCondLst>
-                                    <p:cond delay="0"/>
-                                  </p:stCondLst>
-                                  <p:childTnLst>
-                                    <p:set>
-                                      <p:cBhvr>
-                                        <p:cTn id="11" dur="1" fill="hold">
-                                          <p:stCondLst>
-                                            <p:cond delay="0"/>
-                                          </p:stCondLst>
-                                        </p:cTn>
-                                        <p:tgtEl>
-                                          <p:spTgt spid="374"/>
-                                        </p:tgtEl>
-                                        <p:attrNameLst>
-                                          <p:attrName>style.visibility</p:attrName>
-                                        </p:attrNameLst>
-                                      </p:cBhvr>
-                                      <p:to>
-                                        <p:strVal val="visible"/>
-                                      </p:to>
-                                    </p:set>
-                                    <p:animEffect transition="in" filter="fade">
-                                      <p:cBhvr>
-                                        <p:cTn id="12" dur="1000"/>
-                                        <p:tgtEl>
-                                          <p:spTgt spid="374"/>
-                                        </p:tgtEl>
-                                      </p:cBhvr>
-                                    </p:animEffect>
-                                  </p:childTnLst>
-                                </p:cTn>
-                              </p:par>
-                            </p:childTnLst>
-                          </p:cTn>
-                        </p:par>
-                      </p:childTnLst>
-                    </p:cTn>
-                  </p:par>
-                  <p:par>
-                    <p:cTn id="13" fill="hold">
-                      <p:stCondLst>
-                        <p:cond delay="indefinite"/>
-                      </p:stCondLst>
-                      <p:childTnLst>
-                        <p:par>
-                          <p:cTn id="14" fill="hold">
-                            <p:stCondLst>
-                              <p:cond delay="0"/>
-                            </p:stCondLst>
-                            <p:childTnLst>
-                              <p:par>
-                                <p:cTn id="15" presetID="10" presetClass="entr" presetSubtype="0" fill="hold" nodeType="clickEffect">
-                                  <p:stCondLst>
-                                    <p:cond delay="0"/>
-                                  </p:stCondLst>
-                                  <p:childTnLst>
-                                    <p:set>
-                                      <p:cBhvr>
-                                        <p:cTn id="16" dur="1" fill="hold">
-                                          <p:stCondLst>
-                                            <p:cond delay="0"/>
-                                          </p:stCondLst>
-                                        </p:cTn>
-                                        <p:tgtEl>
-                                          <p:spTgt spid="375"/>
-                                        </p:tgtEl>
-                                        <p:attrNameLst>
-                                          <p:attrName>style.visibility</p:attrName>
-                                        </p:attrNameLst>
-                                      </p:cBhvr>
-                                      <p:to>
-                                        <p:strVal val="visible"/>
-                                      </p:to>
-                                    </p:set>
-                                    <p:animEffect transition="in" filter="fade">
-                                      <p:cBhvr>
-                                        <p:cTn id="17" dur="1000"/>
-                                        <p:tgtEl>
-                                          <p:spTgt spid="375"/>
-                                        </p:tgtEl>
-                                      </p:cBhvr>
-                                    </p:animEffect>
-                                  </p:childTnLst>
-                                </p:cTn>
-                              </p:par>
-                            </p:childTnLst>
-                          </p:cTn>
-                        </p:par>
-                      </p:childTnLst>
-                    </p:cTn>
-                  </p:par>
-                </p:childTnLst>
-              </p:cTn>
-              <p:prevCondLst>
-                <p:cond evt="onPrev" delay="0">
-                  <p:tgtEl>
-                    <p:sldTgt/>
-                  </p:tgtEl>
-                </p:cond>
-              </p:prevCondLst>
-              <p:nextCondLst>
-                <p:cond evt="onNext" delay="0">
-                  <p:tgtEl>
-                    <p:sldTgt/>
-                  </p:tgtEl>
-                </p:cond>
-              </p:nextCondLst>
-            </p:seq>
-          </p:childTnLst>
-        </p:cTn>
-      </p:par>
-    </p:tnLst>
-  </p:timing>
-</p:sld>
-</file>
-
-<file path=ppt/slides/slide21.xml><?xml version="1.0" encoding="utf-8"?>
-<p:sld xmlns:a="http://schemas.openxmlformats.org/drawingml/2006/main" xmlns:r="http://schemas.openxmlformats.org/officeDocument/2006/relationships" xmlns:p="http://schemas.openxmlformats.org/presentationml/2006/main">
-  <p:cSld>
-    <p:spTree>
-      <p:nvGrpSpPr>
         <p:cNvPr id="1" name="Shape 381"/>
         <p:cNvGrpSpPr/>
         <p:nvPr/>
@@ -19355,7 +18229,7 @@
                   <a:schemeClr val="lt1"/>
                 </a:solidFill>
               </a:rPr>
-              <a:t>21</a:t>
+              <a:t>20</a:t>
             </a:fld>
             <a:endParaRPr>
               <a:solidFill>

</xml_diff>